<commit_message>
Buena con la subida hace 16 minutos
</commit_message>
<xml_diff>
--- a/TB-02 PPT.pptx
+++ b/TB-02 PPT.pptx
@@ -36,7 +36,8 @@
     <p:sldId id="285" r:id="rId30"/>
     <p:sldId id="287" r:id="rId31"/>
     <p:sldId id="286" r:id="rId32"/>
-    <p:sldId id="288" r:id="rId33"/>
+    <p:sldId id="289" r:id="rId33"/>
+    <p:sldId id="288" r:id="rId34"/>
   </p:sldIdLst>
   <p:sldSz cx="9144000" cy="6858000" type="screen4x3"/>
   <p:notesSz cx="6858000" cy="9144000"/>
@@ -391,7 +392,7 @@
           <a:p>
             <a:fld id="{BEF9C76F-A3F0-4009-8C78-1FBAE9ED03BF}" type="datetimeFigureOut">
               <a:rPr lang="en-US" smtClean="0"/>
-              <a:t>5/8/2015</a:t>
+              <a:t>5/9/2015</a:t>
             </a:fld>
             <a:endParaRPr lang="en-US"/>
           </a:p>
@@ -604,7 +605,7 @@
           <a:p>
             <a:fld id="{BEF9C76F-A3F0-4009-8C78-1FBAE9ED03BF}" type="datetimeFigureOut">
               <a:rPr lang="en-US" smtClean="0"/>
-              <a:t>5/8/2015</a:t>
+              <a:t>5/9/2015</a:t>
             </a:fld>
             <a:endParaRPr lang="en-US"/>
           </a:p>
@@ -871,7 +872,7 @@
           <a:p>
             <a:fld id="{BEF9C76F-A3F0-4009-8C78-1FBAE9ED03BF}" type="datetimeFigureOut">
               <a:rPr lang="en-US" smtClean="0"/>
-              <a:t>5/8/2015</a:t>
+              <a:t>5/9/2015</a:t>
             </a:fld>
             <a:endParaRPr lang="en-US"/>
           </a:p>
@@ -1021,7 +1022,7 @@
           <a:p>
             <a:fld id="{BEF9C76F-A3F0-4009-8C78-1FBAE9ED03BF}" type="datetimeFigureOut">
               <a:rPr lang="en-US" smtClean="0"/>
-              <a:t>5/8/2015</a:t>
+              <a:t>5/9/2015</a:t>
             </a:fld>
             <a:endParaRPr lang="en-US"/>
           </a:p>
@@ -1351,7 +1352,7 @@
           <a:p>
             <a:fld id="{BEF9C76F-A3F0-4009-8C78-1FBAE9ED03BF}" type="datetimeFigureOut">
               <a:rPr lang="en-US" smtClean="0"/>
-              <a:t>5/8/2015</a:t>
+              <a:t>5/9/2015</a:t>
             </a:fld>
             <a:endParaRPr lang="en-US"/>
           </a:p>
@@ -1659,7 +1660,7 @@
           <a:p>
             <a:fld id="{BEF9C76F-A3F0-4009-8C78-1FBAE9ED03BF}" type="datetimeFigureOut">
               <a:rPr lang="en-US" smtClean="0"/>
-              <a:t>5/8/2015</a:t>
+              <a:t>5/9/2015</a:t>
             </a:fld>
             <a:endParaRPr lang="en-US"/>
           </a:p>
@@ -2080,7 +2081,7 @@
           <a:p>
             <a:fld id="{BEF9C76F-A3F0-4009-8C78-1FBAE9ED03BF}" type="datetimeFigureOut">
               <a:rPr lang="en-US" smtClean="0"/>
-              <a:t>5/8/2015</a:t>
+              <a:t>5/9/2015</a:t>
             </a:fld>
             <a:endParaRPr lang="en-US"/>
           </a:p>
@@ -2193,7 +2194,7 @@
           <a:p>
             <a:fld id="{BEF9C76F-A3F0-4009-8C78-1FBAE9ED03BF}" type="datetimeFigureOut">
               <a:rPr lang="en-US" smtClean="0"/>
-              <a:t>5/8/2015</a:t>
+              <a:t>5/9/2015</a:t>
             </a:fld>
             <a:endParaRPr lang="en-US"/>
           </a:p>
@@ -2352,7 +2353,7 @@
           <a:p>
             <a:fld id="{BEF9C76F-A3F0-4009-8C78-1FBAE9ED03BF}" type="datetimeFigureOut">
               <a:rPr lang="en-US" smtClean="0"/>
-              <a:t>5/8/2015</a:t>
+              <a:t>5/9/2015</a:t>
             </a:fld>
             <a:endParaRPr lang="en-US"/>
           </a:p>
@@ -2736,7 +2737,7 @@
           <a:p>
             <a:fld id="{BEF9C76F-A3F0-4009-8C78-1FBAE9ED03BF}" type="datetimeFigureOut">
               <a:rPr lang="en-US" smtClean="0"/>
-              <a:t>5/8/2015</a:t>
+              <a:t>5/9/2015</a:t>
             </a:fld>
             <a:endParaRPr lang="en-US"/>
           </a:p>
@@ -3098,7 +3099,7 @@
           <a:p>
             <a:fld id="{BEF9C76F-A3F0-4009-8C78-1FBAE9ED03BF}" type="datetimeFigureOut">
               <a:rPr lang="en-US" smtClean="0"/>
-              <a:t>5/8/2015</a:t>
+              <a:t>5/9/2015</a:t>
             </a:fld>
             <a:endParaRPr lang="en-US"/>
           </a:p>
@@ -3432,7 +3433,7 @@
           <a:p>
             <a:fld id="{BEF9C76F-A3F0-4009-8C78-1FBAE9ED03BF}" type="datetimeFigureOut">
               <a:rPr lang="en-US" smtClean="0"/>
-              <a:t>5/8/2015</a:t>
+              <a:t>5/9/2015</a:t>
             </a:fld>
             <a:endParaRPr lang="en-US"/>
           </a:p>
@@ -12840,6 +12841,117 @@
           <a:chExt cx="0" cy="0"/>
         </a:xfrm>
       </p:grpSpPr>
+      <p:sp>
+        <p:nvSpPr>
+          <p:cNvPr id="3" name="2 Título"/>
+          <p:cNvSpPr>
+            <a:spLocks noGrp="1"/>
+          </p:cNvSpPr>
+          <p:nvPr>
+            <p:ph type="title"/>
+          </p:nvPr>
+        </p:nvSpPr>
+        <p:spPr/>
+        <p:txBody>
+          <a:bodyPr/>
+          <a:lstStyle/>
+          <a:p>
+            <a:r>
+              <a:rPr lang="es-PE" dirty="0" smtClean="0"/>
+              <a:t>Diagrama </a:t>
+            </a:r>
+            <a:r>
+              <a:rPr lang="es-PE" dirty="0" err="1" smtClean="0"/>
+              <a:t>runtime</a:t>
+            </a:r>
+            <a:endParaRPr lang="es-PE" dirty="0"/>
+          </a:p>
+        </p:txBody>
+      </p:sp>
+      <p:pic>
+        <p:nvPicPr>
+          <p:cNvPr id="1026" name="Picture 2"/>
+          <p:cNvPicPr>
+            <a:picLocks noChangeAspect="1" noChangeArrowheads="1"/>
+          </p:cNvPicPr>
+          <p:nvPr/>
+        </p:nvPicPr>
+        <p:blipFill>
+          <a:blip r:embed="rId2">
+            <a:extLst>
+              <a:ext uri="{28A0092B-C50C-407E-A947-70E740481C1C}">
+                <a14:useLocalDpi xmlns:a14="http://schemas.microsoft.com/office/drawing/2010/main" val="0"/>
+              </a:ext>
+            </a:extLst>
+          </a:blip>
+          <a:srcRect/>
+          <a:stretch>
+            <a:fillRect/>
+          </a:stretch>
+        </p:blipFill>
+        <p:spPr bwMode="auto">
+          <a:xfrm>
+            <a:off x="1447800" y="1828800"/>
+            <a:ext cx="6574291" cy="4684088"/>
+          </a:xfrm>
+          <a:prstGeom prst="rect">
+            <a:avLst/>
+          </a:prstGeom>
+          <a:noFill/>
+          <a:ln>
+            <a:noFill/>
+          </a:ln>
+          <a:extLst>
+            <a:ext uri="{909E8E84-426E-40DD-AFC4-6F175D3DCCD1}">
+              <a14:hiddenFill xmlns:a14="http://schemas.microsoft.com/office/drawing/2010/main">
+                <a:solidFill>
+                  <a:schemeClr val="accent1"/>
+                </a:solidFill>
+              </a14:hiddenFill>
+            </a:ext>
+            <a:ext uri="{91240B29-F687-4F45-9708-019B960494DF}">
+              <a14:hiddenLine xmlns:a14="http://schemas.microsoft.com/office/drawing/2010/main" w="9525">
+                <a:solidFill>
+                  <a:schemeClr val="tx1"/>
+                </a:solidFill>
+                <a:miter lim="800000"/>
+                <a:headEnd/>
+                <a:tailEnd/>
+              </a14:hiddenLine>
+            </a:ext>
+          </a:extLst>
+        </p:spPr>
+      </p:pic>
+    </p:spTree>
+    <p:extLst>
+      <p:ext uri="{BB962C8B-B14F-4D97-AF65-F5344CB8AC3E}">
+        <p14:creationId xmlns:p14="http://schemas.microsoft.com/office/powerpoint/2010/main" val="2426104572"/>
+      </p:ext>
+    </p:extLst>
+  </p:cSld>
+  <p:clrMapOvr>
+    <a:masterClrMapping/>
+  </p:clrMapOvr>
+</p:sld>
+</file>
+
+<file path=ppt/slides/slide33.xml><?xml version="1.0" encoding="utf-8"?>
+<p:sld xmlns:a="http://schemas.openxmlformats.org/drawingml/2006/main" xmlns:r="http://schemas.openxmlformats.org/officeDocument/2006/relationships" xmlns:p="http://schemas.openxmlformats.org/presentationml/2006/main">
+  <p:cSld>
+    <p:spTree>
+      <p:nvGrpSpPr>
+        <p:cNvPr id="1" name=""/>
+        <p:cNvGrpSpPr/>
+        <p:nvPr/>
+      </p:nvGrpSpPr>
+      <p:grpSpPr>
+        <a:xfrm>
+          <a:off x="0" y="0"/>
+          <a:ext cx="0" cy="0"/>
+          <a:chOff x="0" y="0"/>
+          <a:chExt cx="0" cy="0"/>
+        </a:xfrm>
+      </p:grpSpPr>
       <p:pic>
         <p:nvPicPr>
           <p:cNvPr id="31746" name="Picture 2" descr="http://www.psoe.es/source-media/000000567500/000000567904.jpg"/>

</xml_diff>